<commit_message>
Add embodied agent papers and update datasets
Added new embodied agent papers (Habitat 2.0, iGibson, LEGENT, Safety of Embodied Navigation) to the repository and updated the Python dataset in 1.py to include these methods. Also corrected the year for VRGuide and updated index.html and metadata.json to reflect the new entries.
</commit_message>
<xml_diff>
--- a/Research/_____Writing ISSTA 26/Fig_VRAgent.pptx
+++ b/Research/_____Writing ISSTA 26/Fig_VRAgent.pptx
@@ -2,12 +2,12 @@
 <file path=ppt/presentation.xml><?xml version="1.0" encoding="utf-8"?>
 <p:presentation xmlns:a="http://schemas.openxmlformats.org/drawingml/2006/main" xmlns:r="http://schemas.openxmlformats.org/officeDocument/2006/relationships" xmlns:p="http://schemas.openxmlformats.org/presentationml/2006/main" saveSubsetFonts="1">
   <p:sldMasterIdLst>
-    <p:sldMasterId id="2147483672" r:id="rId1"/>
+    <p:sldMasterId id="2147483684" r:id="rId1"/>
   </p:sldMasterIdLst>
   <p:sldIdLst>
     <p:sldId id="257" r:id="rId2"/>
   </p:sldIdLst>
-  <p:sldSz cx="8999538" cy="3240088"/>
+  <p:sldSz cx="8459788" cy="2987675"/>
   <p:notesSz cx="6858000" cy="9144000"/>
   <p:defaultTextStyle>
     <a:defPPr>
@@ -141,15 +141,15 @@
         </p:nvSpPr>
         <p:spPr>
           <a:xfrm>
-            <a:off x="1124942" y="530264"/>
-            <a:ext cx="6749654" cy="1128031"/>
+            <a:off x="1057474" y="488955"/>
+            <a:ext cx="6344841" cy="1040154"/>
           </a:xfrm>
         </p:spPr>
         <p:txBody>
           <a:bodyPr anchor="b"/>
           <a:lstStyle>
             <a:lvl1pPr algn="ctr">
-              <a:defRPr sz="2835"/>
+              <a:defRPr sz="2614"/>
             </a:lvl1pPr>
           </a:lstStyle>
           <a:p>
@@ -173,8 +173,8 @@
         </p:nvSpPr>
         <p:spPr>
           <a:xfrm>
-            <a:off x="1124942" y="1701796"/>
-            <a:ext cx="6749654" cy="782271"/>
+            <a:off x="1057474" y="1569221"/>
+            <a:ext cx="6344841" cy="721330"/>
           </a:xfrm>
         </p:spPr>
         <p:txBody>
@@ -182,39 +182,39 @@
           <a:lstStyle>
             <a:lvl1pPr marL="0" indent="0" algn="ctr">
               <a:buNone/>
-              <a:defRPr sz="1134"/>
+              <a:defRPr sz="1045"/>
             </a:lvl1pPr>
-            <a:lvl2pPr marL="216027" indent="0" algn="ctr">
+            <a:lvl2pPr marL="199156" indent="0" algn="ctr">
               <a:buNone/>
-              <a:defRPr sz="945"/>
+              <a:defRPr sz="871"/>
             </a:lvl2pPr>
-            <a:lvl3pPr marL="432054" indent="0" algn="ctr">
+            <a:lvl3pPr marL="398313" indent="0" algn="ctr">
               <a:buNone/>
-              <a:defRPr sz="851"/>
+              <a:defRPr sz="784"/>
             </a:lvl3pPr>
-            <a:lvl4pPr marL="648081" indent="0" algn="ctr">
+            <a:lvl4pPr marL="597469" indent="0" algn="ctr">
               <a:buNone/>
-              <a:defRPr sz="756"/>
+              <a:defRPr sz="697"/>
             </a:lvl4pPr>
-            <a:lvl5pPr marL="864108" indent="0" algn="ctr">
+            <a:lvl5pPr marL="796625" indent="0" algn="ctr">
               <a:buNone/>
-              <a:defRPr sz="756"/>
+              <a:defRPr sz="697"/>
             </a:lvl5pPr>
-            <a:lvl6pPr marL="1080135" indent="0" algn="ctr">
+            <a:lvl6pPr marL="995782" indent="0" algn="ctr">
               <a:buNone/>
-              <a:defRPr sz="756"/>
+              <a:defRPr sz="697"/>
             </a:lvl6pPr>
-            <a:lvl7pPr marL="1296162" indent="0" algn="ctr">
+            <a:lvl7pPr marL="1194938" indent="0" algn="ctr">
               <a:buNone/>
-              <a:defRPr sz="756"/>
+              <a:defRPr sz="697"/>
             </a:lvl7pPr>
-            <a:lvl8pPr marL="1512189" indent="0" algn="ctr">
+            <a:lvl8pPr marL="1394094" indent="0" algn="ctr">
               <a:buNone/>
-              <a:defRPr sz="756"/>
+              <a:defRPr sz="697"/>
             </a:lvl8pPr>
-            <a:lvl9pPr marL="1728216" indent="0" algn="ctr">
+            <a:lvl9pPr marL="1593251" indent="0" algn="ctr">
               <a:buNone/>
-              <a:defRPr sz="756"/>
+              <a:defRPr sz="697"/>
             </a:lvl9pPr>
           </a:lstStyle>
           <a:p>
@@ -294,7 +294,7 @@
     </p:spTree>
     <p:extLst>
       <p:ext uri="{BB962C8B-B14F-4D97-AF65-F5344CB8AC3E}">
-        <p14:creationId xmlns:p14="http://schemas.microsoft.com/office/powerpoint/2010/main" val="1401846398"/>
+        <p14:creationId xmlns:p14="http://schemas.microsoft.com/office/powerpoint/2010/main" val="315223734"/>
       </p:ext>
     </p:extLst>
   </p:cSld>
@@ -464,7 +464,7 @@
     </p:spTree>
     <p:extLst>
       <p:ext uri="{BB962C8B-B14F-4D97-AF65-F5344CB8AC3E}">
-        <p14:creationId xmlns:p14="http://schemas.microsoft.com/office/powerpoint/2010/main" val="4129327452"/>
+        <p14:creationId xmlns:p14="http://schemas.microsoft.com/office/powerpoint/2010/main" val="1306836221"/>
       </p:ext>
     </p:extLst>
   </p:cSld>
@@ -503,8 +503,8 @@
         </p:nvSpPr>
         <p:spPr>
           <a:xfrm>
-            <a:off x="6440295" y="172505"/>
-            <a:ext cx="1940525" cy="2745825"/>
+            <a:off x="6054036" y="159066"/>
+            <a:ext cx="1824142" cy="2531916"/>
           </a:xfrm>
         </p:spPr>
         <p:txBody>
@@ -531,8 +531,8 @@
         </p:nvSpPr>
         <p:spPr>
           <a:xfrm>
-            <a:off x="618718" y="172505"/>
-            <a:ext cx="5709082" cy="2745825"/>
+            <a:off x="581610" y="159066"/>
+            <a:ext cx="5366678" cy="2531916"/>
           </a:xfrm>
         </p:spPr>
         <p:txBody>
@@ -644,7 +644,7 @@
     </p:spTree>
     <p:extLst>
       <p:ext uri="{BB962C8B-B14F-4D97-AF65-F5344CB8AC3E}">
-        <p14:creationId xmlns:p14="http://schemas.microsoft.com/office/powerpoint/2010/main" val="2314434729"/>
+        <p14:creationId xmlns:p14="http://schemas.microsoft.com/office/powerpoint/2010/main" val="2400672799"/>
       </p:ext>
     </p:extLst>
   </p:cSld>
@@ -814,7 +814,7 @@
     </p:spTree>
     <p:extLst>
       <p:ext uri="{BB962C8B-B14F-4D97-AF65-F5344CB8AC3E}">
-        <p14:creationId xmlns:p14="http://schemas.microsoft.com/office/powerpoint/2010/main" val="1710635067"/>
+        <p14:creationId xmlns:p14="http://schemas.microsoft.com/office/powerpoint/2010/main" val="2373887167"/>
       </p:ext>
     </p:extLst>
   </p:cSld>
@@ -853,15 +853,15 @@
         </p:nvSpPr>
         <p:spPr>
           <a:xfrm>
-            <a:off x="614031" y="807773"/>
-            <a:ext cx="7762102" cy="1347786"/>
+            <a:off x="577204" y="744844"/>
+            <a:ext cx="7296567" cy="1242790"/>
           </a:xfrm>
         </p:spPr>
         <p:txBody>
           <a:bodyPr anchor="b"/>
           <a:lstStyle>
             <a:lvl1pPr>
-              <a:defRPr sz="2835"/>
+              <a:defRPr sz="2614"/>
             </a:lvl1pPr>
           </a:lstStyle>
           <a:p>
@@ -885,8 +885,8 @@
         </p:nvSpPr>
         <p:spPr>
           <a:xfrm>
-            <a:off x="614031" y="2168309"/>
-            <a:ext cx="7762102" cy="708769"/>
+            <a:off x="577204" y="1999391"/>
+            <a:ext cx="7296567" cy="653554"/>
           </a:xfrm>
         </p:spPr>
         <p:txBody>
@@ -894,7 +894,7 @@
           <a:lstStyle>
             <a:lvl1pPr marL="0" indent="0">
               <a:buNone/>
-              <a:defRPr sz="1134">
+              <a:defRPr sz="1045">
                 <a:solidFill>
                   <a:schemeClr val="tx1">
                     <a:tint val="75000"/>
@@ -902,9 +902,9 @@
                 </a:solidFill>
               </a:defRPr>
             </a:lvl1pPr>
-            <a:lvl2pPr marL="216027" indent="0">
+            <a:lvl2pPr marL="199156" indent="0">
               <a:buNone/>
-              <a:defRPr sz="945">
+              <a:defRPr sz="871">
                 <a:solidFill>
                   <a:schemeClr val="tx1">
                     <a:tint val="75000"/>
@@ -912,9 +912,9 @@
                 </a:solidFill>
               </a:defRPr>
             </a:lvl2pPr>
-            <a:lvl3pPr marL="432054" indent="0">
+            <a:lvl3pPr marL="398313" indent="0">
               <a:buNone/>
-              <a:defRPr sz="851">
+              <a:defRPr sz="784">
                 <a:solidFill>
                   <a:schemeClr val="tx1">
                     <a:tint val="75000"/>
@@ -922,9 +922,9 @@
                 </a:solidFill>
               </a:defRPr>
             </a:lvl3pPr>
-            <a:lvl4pPr marL="648081" indent="0">
+            <a:lvl4pPr marL="597469" indent="0">
               <a:buNone/>
-              <a:defRPr sz="756">
+              <a:defRPr sz="697">
                 <a:solidFill>
                   <a:schemeClr val="tx1">
                     <a:tint val="75000"/>
@@ -932,9 +932,9 @@
                 </a:solidFill>
               </a:defRPr>
             </a:lvl4pPr>
-            <a:lvl5pPr marL="864108" indent="0">
+            <a:lvl5pPr marL="796625" indent="0">
               <a:buNone/>
-              <a:defRPr sz="756">
+              <a:defRPr sz="697">
                 <a:solidFill>
                   <a:schemeClr val="tx1">
                     <a:tint val="75000"/>
@@ -942,9 +942,9 @@
                 </a:solidFill>
               </a:defRPr>
             </a:lvl5pPr>
-            <a:lvl6pPr marL="1080135" indent="0">
+            <a:lvl6pPr marL="995782" indent="0">
               <a:buNone/>
-              <a:defRPr sz="756">
+              <a:defRPr sz="697">
                 <a:solidFill>
                   <a:schemeClr val="tx1">
                     <a:tint val="75000"/>
@@ -952,9 +952,9 @@
                 </a:solidFill>
               </a:defRPr>
             </a:lvl6pPr>
-            <a:lvl7pPr marL="1296162" indent="0">
+            <a:lvl7pPr marL="1194938" indent="0">
               <a:buNone/>
-              <a:defRPr sz="756">
+              <a:defRPr sz="697">
                 <a:solidFill>
                   <a:schemeClr val="tx1">
                     <a:tint val="75000"/>
@@ -962,9 +962,9 @@
                 </a:solidFill>
               </a:defRPr>
             </a:lvl7pPr>
-            <a:lvl8pPr marL="1512189" indent="0">
+            <a:lvl8pPr marL="1394094" indent="0">
               <a:buNone/>
-              <a:defRPr sz="756">
+              <a:defRPr sz="697">
                 <a:solidFill>
                   <a:schemeClr val="tx1">
                     <a:tint val="75000"/>
@@ -972,9 +972,9 @@
                 </a:solidFill>
               </a:defRPr>
             </a:lvl8pPr>
-            <a:lvl9pPr marL="1728216" indent="0">
+            <a:lvl9pPr marL="1593251" indent="0">
               <a:buNone/>
-              <a:defRPr sz="756">
+              <a:defRPr sz="697">
                 <a:solidFill>
                   <a:schemeClr val="tx1">
                     <a:tint val="75000"/>
@@ -1060,7 +1060,7 @@
     </p:spTree>
     <p:extLst>
       <p:ext uri="{BB962C8B-B14F-4D97-AF65-F5344CB8AC3E}">
-        <p14:creationId xmlns:p14="http://schemas.microsoft.com/office/powerpoint/2010/main" val="2863663749"/>
+        <p14:creationId xmlns:p14="http://schemas.microsoft.com/office/powerpoint/2010/main" val="914921691"/>
       </p:ext>
     </p:extLst>
   </p:cSld>
@@ -1122,8 +1122,8 @@
         </p:nvSpPr>
         <p:spPr>
           <a:xfrm>
-            <a:off x="618718" y="862523"/>
-            <a:ext cx="3824804" cy="2055806"/>
+            <a:off x="581610" y="795330"/>
+            <a:ext cx="3595410" cy="1895652"/>
           </a:xfrm>
         </p:spPr>
         <p:txBody>
@@ -1179,8 +1179,8 @@
         </p:nvSpPr>
         <p:spPr>
           <a:xfrm>
-            <a:off x="4556016" y="862523"/>
-            <a:ext cx="3824804" cy="2055806"/>
+            <a:off x="4282768" y="795330"/>
+            <a:ext cx="3595410" cy="1895652"/>
           </a:xfrm>
         </p:spPr>
         <p:txBody>
@@ -1292,7 +1292,7 @@
     </p:spTree>
     <p:extLst>
       <p:ext uri="{BB962C8B-B14F-4D97-AF65-F5344CB8AC3E}">
-        <p14:creationId xmlns:p14="http://schemas.microsoft.com/office/powerpoint/2010/main" val="4277113843"/>
+        <p14:creationId xmlns:p14="http://schemas.microsoft.com/office/powerpoint/2010/main" val="1200557781"/>
       </p:ext>
     </p:extLst>
   </p:cSld>
@@ -1331,8 +1331,8 @@
         </p:nvSpPr>
         <p:spPr>
           <a:xfrm>
-            <a:off x="619890" y="172505"/>
-            <a:ext cx="7762102" cy="626267"/>
+            <a:off x="582712" y="159066"/>
+            <a:ext cx="7296567" cy="577479"/>
           </a:xfrm>
         </p:spPr>
         <p:txBody>
@@ -1359,8 +1359,8 @@
         </p:nvSpPr>
         <p:spPr>
           <a:xfrm>
-            <a:off x="619891" y="794272"/>
-            <a:ext cx="3807226" cy="389260"/>
+            <a:off x="582712" y="732395"/>
+            <a:ext cx="3578887" cy="358936"/>
           </a:xfrm>
         </p:spPr>
         <p:txBody>
@@ -1368,39 +1368,39 @@
           <a:lstStyle>
             <a:lvl1pPr marL="0" indent="0">
               <a:buNone/>
-              <a:defRPr sz="1134" b="1"/>
+              <a:defRPr sz="1045" b="1"/>
             </a:lvl1pPr>
-            <a:lvl2pPr marL="216027" indent="0">
+            <a:lvl2pPr marL="199156" indent="0">
               <a:buNone/>
-              <a:defRPr sz="945" b="1"/>
+              <a:defRPr sz="871" b="1"/>
             </a:lvl2pPr>
-            <a:lvl3pPr marL="432054" indent="0">
+            <a:lvl3pPr marL="398313" indent="0">
               <a:buNone/>
-              <a:defRPr sz="851" b="1"/>
+              <a:defRPr sz="784" b="1"/>
             </a:lvl3pPr>
-            <a:lvl4pPr marL="648081" indent="0">
+            <a:lvl4pPr marL="597469" indent="0">
               <a:buNone/>
-              <a:defRPr sz="756" b="1"/>
+              <a:defRPr sz="697" b="1"/>
             </a:lvl4pPr>
-            <a:lvl5pPr marL="864108" indent="0">
+            <a:lvl5pPr marL="796625" indent="0">
               <a:buNone/>
-              <a:defRPr sz="756" b="1"/>
+              <a:defRPr sz="697" b="1"/>
             </a:lvl5pPr>
-            <a:lvl6pPr marL="1080135" indent="0">
+            <a:lvl6pPr marL="995782" indent="0">
               <a:buNone/>
-              <a:defRPr sz="756" b="1"/>
+              <a:defRPr sz="697" b="1"/>
             </a:lvl6pPr>
-            <a:lvl7pPr marL="1296162" indent="0">
+            <a:lvl7pPr marL="1194938" indent="0">
               <a:buNone/>
-              <a:defRPr sz="756" b="1"/>
+              <a:defRPr sz="697" b="1"/>
             </a:lvl7pPr>
-            <a:lvl8pPr marL="1512189" indent="0">
+            <a:lvl8pPr marL="1394094" indent="0">
               <a:buNone/>
-              <a:defRPr sz="756" b="1"/>
+              <a:defRPr sz="697" b="1"/>
             </a:lvl8pPr>
-            <a:lvl9pPr marL="1728216" indent="0">
+            <a:lvl9pPr marL="1593251" indent="0">
               <a:buNone/>
-              <a:defRPr sz="756" b="1"/>
+              <a:defRPr sz="697" b="1"/>
             </a:lvl9pPr>
           </a:lstStyle>
           <a:p>
@@ -1424,8 +1424,8 @@
         </p:nvSpPr>
         <p:spPr>
           <a:xfrm>
-            <a:off x="619891" y="1183532"/>
-            <a:ext cx="3807226" cy="1740798"/>
+            <a:off x="582712" y="1091331"/>
+            <a:ext cx="3578887" cy="1605184"/>
           </a:xfrm>
         </p:spPr>
         <p:txBody>
@@ -1481,8 +1481,8 @@
         </p:nvSpPr>
         <p:spPr>
           <a:xfrm>
-            <a:off x="4556016" y="794272"/>
-            <a:ext cx="3825976" cy="389260"/>
+            <a:off x="4282768" y="732395"/>
+            <a:ext cx="3596512" cy="358936"/>
           </a:xfrm>
         </p:spPr>
         <p:txBody>
@@ -1490,39 +1490,39 @@
           <a:lstStyle>
             <a:lvl1pPr marL="0" indent="0">
               <a:buNone/>
-              <a:defRPr sz="1134" b="1"/>
+              <a:defRPr sz="1045" b="1"/>
             </a:lvl1pPr>
-            <a:lvl2pPr marL="216027" indent="0">
+            <a:lvl2pPr marL="199156" indent="0">
               <a:buNone/>
-              <a:defRPr sz="945" b="1"/>
+              <a:defRPr sz="871" b="1"/>
             </a:lvl2pPr>
-            <a:lvl3pPr marL="432054" indent="0">
+            <a:lvl3pPr marL="398313" indent="0">
               <a:buNone/>
-              <a:defRPr sz="851" b="1"/>
+              <a:defRPr sz="784" b="1"/>
             </a:lvl3pPr>
-            <a:lvl4pPr marL="648081" indent="0">
+            <a:lvl4pPr marL="597469" indent="0">
               <a:buNone/>
-              <a:defRPr sz="756" b="1"/>
+              <a:defRPr sz="697" b="1"/>
             </a:lvl4pPr>
-            <a:lvl5pPr marL="864108" indent="0">
+            <a:lvl5pPr marL="796625" indent="0">
               <a:buNone/>
-              <a:defRPr sz="756" b="1"/>
+              <a:defRPr sz="697" b="1"/>
             </a:lvl5pPr>
-            <a:lvl6pPr marL="1080135" indent="0">
+            <a:lvl6pPr marL="995782" indent="0">
               <a:buNone/>
-              <a:defRPr sz="756" b="1"/>
+              <a:defRPr sz="697" b="1"/>
             </a:lvl6pPr>
-            <a:lvl7pPr marL="1296162" indent="0">
+            <a:lvl7pPr marL="1194938" indent="0">
               <a:buNone/>
-              <a:defRPr sz="756" b="1"/>
+              <a:defRPr sz="697" b="1"/>
             </a:lvl7pPr>
-            <a:lvl8pPr marL="1512189" indent="0">
+            <a:lvl8pPr marL="1394094" indent="0">
               <a:buNone/>
-              <a:defRPr sz="756" b="1"/>
+              <a:defRPr sz="697" b="1"/>
             </a:lvl8pPr>
-            <a:lvl9pPr marL="1728216" indent="0">
+            <a:lvl9pPr marL="1593251" indent="0">
               <a:buNone/>
-              <a:defRPr sz="756" b="1"/>
+              <a:defRPr sz="697" b="1"/>
             </a:lvl9pPr>
           </a:lstStyle>
           <a:p>
@@ -1546,8 +1546,8 @@
         </p:nvSpPr>
         <p:spPr>
           <a:xfrm>
-            <a:off x="4556016" y="1183532"/>
-            <a:ext cx="3825976" cy="1740798"/>
+            <a:off x="4282768" y="1091331"/>
+            <a:ext cx="3596512" cy="1605184"/>
           </a:xfrm>
         </p:spPr>
         <p:txBody>
@@ -1659,7 +1659,7 @@
     </p:spTree>
     <p:extLst>
       <p:ext uri="{BB962C8B-B14F-4D97-AF65-F5344CB8AC3E}">
-        <p14:creationId xmlns:p14="http://schemas.microsoft.com/office/powerpoint/2010/main" val="319565921"/>
+        <p14:creationId xmlns:p14="http://schemas.microsoft.com/office/powerpoint/2010/main" val="3175503679"/>
       </p:ext>
     </p:extLst>
   </p:cSld>
@@ -1777,7 +1777,7 @@
     </p:spTree>
     <p:extLst>
       <p:ext uri="{BB962C8B-B14F-4D97-AF65-F5344CB8AC3E}">
-        <p14:creationId xmlns:p14="http://schemas.microsoft.com/office/powerpoint/2010/main" val="3638416669"/>
+        <p14:creationId xmlns:p14="http://schemas.microsoft.com/office/powerpoint/2010/main" val="2062046609"/>
       </p:ext>
     </p:extLst>
   </p:cSld>
@@ -1872,7 +1872,7 @@
     </p:spTree>
     <p:extLst>
       <p:ext uri="{BB962C8B-B14F-4D97-AF65-F5344CB8AC3E}">
-        <p14:creationId xmlns:p14="http://schemas.microsoft.com/office/powerpoint/2010/main" val="3581004079"/>
+        <p14:creationId xmlns:p14="http://schemas.microsoft.com/office/powerpoint/2010/main" val="1248739398"/>
       </p:ext>
     </p:extLst>
   </p:cSld>
@@ -1911,15 +1911,15 @@
         </p:nvSpPr>
         <p:spPr>
           <a:xfrm>
-            <a:off x="619891" y="216006"/>
-            <a:ext cx="2902585" cy="756021"/>
+            <a:off x="582712" y="199178"/>
+            <a:ext cx="2728502" cy="697124"/>
           </a:xfrm>
         </p:spPr>
         <p:txBody>
           <a:bodyPr anchor="b"/>
           <a:lstStyle>
             <a:lvl1pPr>
-              <a:defRPr sz="1512"/>
+              <a:defRPr sz="1394"/>
             </a:lvl1pPr>
           </a:lstStyle>
           <a:p>
@@ -1943,39 +1943,39 @@
         </p:nvSpPr>
         <p:spPr>
           <a:xfrm>
-            <a:off x="3825976" y="466513"/>
-            <a:ext cx="4556016" cy="2302563"/>
+            <a:off x="3596512" y="430170"/>
+            <a:ext cx="4282768" cy="2123186"/>
           </a:xfrm>
         </p:spPr>
         <p:txBody>
           <a:bodyPr/>
           <a:lstStyle>
             <a:lvl1pPr>
-              <a:defRPr sz="1512"/>
+              <a:defRPr sz="1394"/>
             </a:lvl1pPr>
             <a:lvl2pPr>
-              <a:defRPr sz="1323"/>
+              <a:defRPr sz="1220"/>
             </a:lvl2pPr>
             <a:lvl3pPr>
-              <a:defRPr sz="1134"/>
+              <a:defRPr sz="1045"/>
             </a:lvl3pPr>
             <a:lvl4pPr>
-              <a:defRPr sz="945"/>
+              <a:defRPr sz="871"/>
             </a:lvl4pPr>
             <a:lvl5pPr>
-              <a:defRPr sz="945"/>
+              <a:defRPr sz="871"/>
             </a:lvl5pPr>
             <a:lvl6pPr>
-              <a:defRPr sz="945"/>
+              <a:defRPr sz="871"/>
             </a:lvl6pPr>
             <a:lvl7pPr>
-              <a:defRPr sz="945"/>
+              <a:defRPr sz="871"/>
             </a:lvl7pPr>
             <a:lvl8pPr>
-              <a:defRPr sz="945"/>
+              <a:defRPr sz="871"/>
             </a:lvl8pPr>
             <a:lvl9pPr>
-              <a:defRPr sz="945"/>
+              <a:defRPr sz="871"/>
             </a:lvl9pPr>
           </a:lstStyle>
           <a:p>
@@ -2028,8 +2028,8 @@
         </p:nvSpPr>
         <p:spPr>
           <a:xfrm>
-            <a:off x="619891" y="972026"/>
-            <a:ext cx="2902585" cy="1800799"/>
+            <a:off x="582712" y="896303"/>
+            <a:ext cx="2728502" cy="1660511"/>
           </a:xfrm>
         </p:spPr>
         <p:txBody>
@@ -2037,39 +2037,39 @@
           <a:lstStyle>
             <a:lvl1pPr marL="0" indent="0">
               <a:buNone/>
-              <a:defRPr sz="756"/>
+              <a:defRPr sz="697"/>
             </a:lvl1pPr>
-            <a:lvl2pPr marL="216027" indent="0">
+            <a:lvl2pPr marL="199156" indent="0">
               <a:buNone/>
-              <a:defRPr sz="662"/>
+              <a:defRPr sz="610"/>
             </a:lvl2pPr>
-            <a:lvl3pPr marL="432054" indent="0">
+            <a:lvl3pPr marL="398313" indent="0">
               <a:buNone/>
-              <a:defRPr sz="567"/>
+              <a:defRPr sz="523"/>
             </a:lvl3pPr>
-            <a:lvl4pPr marL="648081" indent="0">
+            <a:lvl4pPr marL="597469" indent="0">
               <a:buNone/>
-              <a:defRPr sz="472"/>
+              <a:defRPr sz="436"/>
             </a:lvl4pPr>
-            <a:lvl5pPr marL="864108" indent="0">
+            <a:lvl5pPr marL="796625" indent="0">
               <a:buNone/>
-              <a:defRPr sz="472"/>
+              <a:defRPr sz="436"/>
             </a:lvl5pPr>
-            <a:lvl6pPr marL="1080135" indent="0">
+            <a:lvl6pPr marL="995782" indent="0">
               <a:buNone/>
-              <a:defRPr sz="472"/>
+              <a:defRPr sz="436"/>
             </a:lvl6pPr>
-            <a:lvl7pPr marL="1296162" indent="0">
+            <a:lvl7pPr marL="1194938" indent="0">
               <a:buNone/>
-              <a:defRPr sz="472"/>
+              <a:defRPr sz="436"/>
             </a:lvl7pPr>
-            <a:lvl8pPr marL="1512189" indent="0">
+            <a:lvl8pPr marL="1394094" indent="0">
               <a:buNone/>
-              <a:defRPr sz="472"/>
+              <a:defRPr sz="436"/>
             </a:lvl8pPr>
-            <a:lvl9pPr marL="1728216" indent="0">
+            <a:lvl9pPr marL="1593251" indent="0">
               <a:buNone/>
-              <a:defRPr sz="472"/>
+              <a:defRPr sz="436"/>
             </a:lvl9pPr>
           </a:lstStyle>
           <a:p>
@@ -2149,7 +2149,7 @@
     </p:spTree>
     <p:extLst>
       <p:ext uri="{BB962C8B-B14F-4D97-AF65-F5344CB8AC3E}">
-        <p14:creationId xmlns:p14="http://schemas.microsoft.com/office/powerpoint/2010/main" val="1747226144"/>
+        <p14:creationId xmlns:p14="http://schemas.microsoft.com/office/powerpoint/2010/main" val="911254958"/>
       </p:ext>
     </p:extLst>
   </p:cSld>
@@ -2188,15 +2188,15 @@
         </p:nvSpPr>
         <p:spPr>
           <a:xfrm>
-            <a:off x="619891" y="216006"/>
-            <a:ext cx="2902585" cy="756021"/>
+            <a:off x="582712" y="199178"/>
+            <a:ext cx="2728502" cy="697124"/>
           </a:xfrm>
         </p:spPr>
         <p:txBody>
           <a:bodyPr anchor="b"/>
           <a:lstStyle>
             <a:lvl1pPr>
-              <a:defRPr sz="1512"/>
+              <a:defRPr sz="1394"/>
             </a:lvl1pPr>
           </a:lstStyle>
           <a:p>
@@ -2220,8 +2220,8 @@
         </p:nvSpPr>
         <p:spPr>
           <a:xfrm>
-            <a:off x="3825976" y="466513"/>
-            <a:ext cx="4556016" cy="2302563"/>
+            <a:off x="3596512" y="430170"/>
+            <a:ext cx="4282768" cy="2123186"/>
           </a:xfrm>
         </p:spPr>
         <p:txBody>
@@ -2229,39 +2229,39 @@
           <a:lstStyle>
             <a:lvl1pPr marL="0" indent="0">
               <a:buNone/>
-              <a:defRPr sz="1512"/>
+              <a:defRPr sz="1394"/>
             </a:lvl1pPr>
-            <a:lvl2pPr marL="216027" indent="0">
+            <a:lvl2pPr marL="199156" indent="0">
               <a:buNone/>
-              <a:defRPr sz="1323"/>
+              <a:defRPr sz="1220"/>
             </a:lvl2pPr>
-            <a:lvl3pPr marL="432054" indent="0">
+            <a:lvl3pPr marL="398313" indent="0">
               <a:buNone/>
-              <a:defRPr sz="1134"/>
+              <a:defRPr sz="1045"/>
             </a:lvl3pPr>
-            <a:lvl4pPr marL="648081" indent="0">
+            <a:lvl4pPr marL="597469" indent="0">
               <a:buNone/>
-              <a:defRPr sz="945"/>
+              <a:defRPr sz="871"/>
             </a:lvl4pPr>
-            <a:lvl5pPr marL="864108" indent="0">
+            <a:lvl5pPr marL="796625" indent="0">
               <a:buNone/>
-              <a:defRPr sz="945"/>
+              <a:defRPr sz="871"/>
             </a:lvl5pPr>
-            <a:lvl6pPr marL="1080135" indent="0">
+            <a:lvl6pPr marL="995782" indent="0">
               <a:buNone/>
-              <a:defRPr sz="945"/>
+              <a:defRPr sz="871"/>
             </a:lvl6pPr>
-            <a:lvl7pPr marL="1296162" indent="0">
+            <a:lvl7pPr marL="1194938" indent="0">
               <a:buNone/>
-              <a:defRPr sz="945"/>
+              <a:defRPr sz="871"/>
             </a:lvl7pPr>
-            <a:lvl8pPr marL="1512189" indent="0">
+            <a:lvl8pPr marL="1394094" indent="0">
               <a:buNone/>
-              <a:defRPr sz="945"/>
+              <a:defRPr sz="871"/>
             </a:lvl8pPr>
-            <a:lvl9pPr marL="1728216" indent="0">
+            <a:lvl9pPr marL="1593251" indent="0">
               <a:buNone/>
-              <a:defRPr sz="945"/>
+              <a:defRPr sz="871"/>
             </a:lvl9pPr>
           </a:lstStyle>
           <a:p>
@@ -2285,8 +2285,8 @@
         </p:nvSpPr>
         <p:spPr>
           <a:xfrm>
-            <a:off x="619891" y="972026"/>
-            <a:ext cx="2902585" cy="1800799"/>
+            <a:off x="582712" y="896303"/>
+            <a:ext cx="2728502" cy="1660511"/>
           </a:xfrm>
         </p:spPr>
         <p:txBody>
@@ -2294,39 +2294,39 @@
           <a:lstStyle>
             <a:lvl1pPr marL="0" indent="0">
               <a:buNone/>
-              <a:defRPr sz="756"/>
+              <a:defRPr sz="697"/>
             </a:lvl1pPr>
-            <a:lvl2pPr marL="216027" indent="0">
+            <a:lvl2pPr marL="199156" indent="0">
               <a:buNone/>
-              <a:defRPr sz="662"/>
+              <a:defRPr sz="610"/>
             </a:lvl2pPr>
-            <a:lvl3pPr marL="432054" indent="0">
+            <a:lvl3pPr marL="398313" indent="0">
               <a:buNone/>
-              <a:defRPr sz="567"/>
+              <a:defRPr sz="523"/>
             </a:lvl3pPr>
-            <a:lvl4pPr marL="648081" indent="0">
+            <a:lvl4pPr marL="597469" indent="0">
               <a:buNone/>
-              <a:defRPr sz="472"/>
+              <a:defRPr sz="436"/>
             </a:lvl4pPr>
-            <a:lvl5pPr marL="864108" indent="0">
+            <a:lvl5pPr marL="796625" indent="0">
               <a:buNone/>
-              <a:defRPr sz="472"/>
+              <a:defRPr sz="436"/>
             </a:lvl5pPr>
-            <a:lvl6pPr marL="1080135" indent="0">
+            <a:lvl6pPr marL="995782" indent="0">
               <a:buNone/>
-              <a:defRPr sz="472"/>
+              <a:defRPr sz="436"/>
             </a:lvl6pPr>
-            <a:lvl7pPr marL="1296162" indent="0">
+            <a:lvl7pPr marL="1194938" indent="0">
               <a:buNone/>
-              <a:defRPr sz="472"/>
+              <a:defRPr sz="436"/>
             </a:lvl7pPr>
-            <a:lvl8pPr marL="1512189" indent="0">
+            <a:lvl8pPr marL="1394094" indent="0">
               <a:buNone/>
-              <a:defRPr sz="472"/>
+              <a:defRPr sz="436"/>
             </a:lvl8pPr>
-            <a:lvl9pPr marL="1728216" indent="0">
+            <a:lvl9pPr marL="1593251" indent="0">
               <a:buNone/>
-              <a:defRPr sz="472"/>
+              <a:defRPr sz="436"/>
             </a:lvl9pPr>
           </a:lstStyle>
           <a:p>
@@ -2406,7 +2406,7 @@
     </p:spTree>
     <p:extLst>
       <p:ext uri="{BB962C8B-B14F-4D97-AF65-F5344CB8AC3E}">
-        <p14:creationId xmlns:p14="http://schemas.microsoft.com/office/powerpoint/2010/main" val="3552900012"/>
+        <p14:creationId xmlns:p14="http://schemas.microsoft.com/office/powerpoint/2010/main" val="1625536473"/>
       </p:ext>
     </p:extLst>
   </p:cSld>
@@ -2450,8 +2450,8 @@
         </p:nvSpPr>
         <p:spPr>
           <a:xfrm>
-            <a:off x="618718" y="172505"/>
-            <a:ext cx="7762102" cy="626267"/>
+            <a:off x="581611" y="159066"/>
+            <a:ext cx="7296567" cy="577479"/>
           </a:xfrm>
           <a:prstGeom prst="rect">
             <a:avLst/>
@@ -2483,8 +2483,8 @@
         </p:nvSpPr>
         <p:spPr>
           <a:xfrm>
-            <a:off x="618718" y="862523"/>
-            <a:ext cx="7762102" cy="2055806"/>
+            <a:off x="581611" y="795330"/>
+            <a:ext cx="7296567" cy="1895652"/>
           </a:xfrm>
           <a:prstGeom prst="rect">
             <a:avLst/>
@@ -2545,8 +2545,8 @@
         </p:nvSpPr>
         <p:spPr>
           <a:xfrm>
-            <a:off x="618718" y="3003082"/>
-            <a:ext cx="2024896" cy="172505"/>
+            <a:off x="581611" y="2769132"/>
+            <a:ext cx="1903452" cy="159066"/>
           </a:xfrm>
           <a:prstGeom prst="rect">
             <a:avLst/>
@@ -2556,7 +2556,7 @@
           <a:bodyPr vert="horz" lIns="91440" tIns="45720" rIns="91440" bIns="45720" rtlCol="0" anchor="ctr"/>
           <a:lstStyle>
             <a:lvl1pPr algn="l">
-              <a:defRPr sz="567">
+              <a:defRPr sz="523">
                 <a:solidFill>
                   <a:schemeClr val="tx1">
                     <a:tint val="75000"/>
@@ -2586,8 +2586,8 @@
         </p:nvSpPr>
         <p:spPr>
           <a:xfrm>
-            <a:off x="2981097" y="3003082"/>
-            <a:ext cx="3037344" cy="172505"/>
+            <a:off x="2802305" y="2769132"/>
+            <a:ext cx="2855178" cy="159066"/>
           </a:xfrm>
           <a:prstGeom prst="rect">
             <a:avLst/>
@@ -2597,7 +2597,7 @@
           <a:bodyPr vert="horz" lIns="91440" tIns="45720" rIns="91440" bIns="45720" rtlCol="0" anchor="ctr"/>
           <a:lstStyle>
             <a:lvl1pPr algn="ctr">
-              <a:defRPr sz="567">
+              <a:defRPr sz="523">
                 <a:solidFill>
                   <a:schemeClr val="tx1">
                     <a:tint val="75000"/>
@@ -2623,8 +2623,8 @@
         </p:nvSpPr>
         <p:spPr>
           <a:xfrm>
-            <a:off x="6355924" y="3003082"/>
-            <a:ext cx="2024896" cy="172505"/>
+            <a:off x="5974725" y="2769132"/>
+            <a:ext cx="1903452" cy="159066"/>
           </a:xfrm>
           <a:prstGeom prst="rect">
             <a:avLst/>
@@ -2634,7 +2634,7 @@
           <a:bodyPr vert="horz" lIns="91440" tIns="45720" rIns="91440" bIns="45720" rtlCol="0" anchor="ctr"/>
           <a:lstStyle>
             <a:lvl1pPr algn="r">
-              <a:defRPr sz="567">
+              <a:defRPr sz="523">
                 <a:solidFill>
                   <a:schemeClr val="tx1">
                     <a:tint val="75000"/>
@@ -2655,27 +2655,27 @@
     </p:spTree>
     <p:extLst>
       <p:ext uri="{BB962C8B-B14F-4D97-AF65-F5344CB8AC3E}">
-        <p14:creationId xmlns:p14="http://schemas.microsoft.com/office/powerpoint/2010/main" val="493031736"/>
+        <p14:creationId xmlns:p14="http://schemas.microsoft.com/office/powerpoint/2010/main" val="2508987908"/>
       </p:ext>
     </p:extLst>
   </p:cSld>
   <p:clrMap bg1="lt1" tx1="dk1" bg2="lt2" tx2="dk2" accent1="accent1" accent2="accent2" accent3="accent3" accent4="accent4" accent5="accent5" accent6="accent6" hlink="hlink" folHlink="folHlink"/>
   <p:sldLayoutIdLst>
-    <p:sldLayoutId id="2147483673" r:id="rId1"/>
-    <p:sldLayoutId id="2147483674" r:id="rId2"/>
-    <p:sldLayoutId id="2147483675" r:id="rId3"/>
-    <p:sldLayoutId id="2147483676" r:id="rId4"/>
-    <p:sldLayoutId id="2147483677" r:id="rId5"/>
-    <p:sldLayoutId id="2147483678" r:id="rId6"/>
-    <p:sldLayoutId id="2147483679" r:id="rId7"/>
-    <p:sldLayoutId id="2147483680" r:id="rId8"/>
-    <p:sldLayoutId id="2147483681" r:id="rId9"/>
-    <p:sldLayoutId id="2147483682" r:id="rId10"/>
-    <p:sldLayoutId id="2147483683" r:id="rId11"/>
+    <p:sldLayoutId id="2147483685" r:id="rId1"/>
+    <p:sldLayoutId id="2147483686" r:id="rId2"/>
+    <p:sldLayoutId id="2147483687" r:id="rId3"/>
+    <p:sldLayoutId id="2147483688" r:id="rId4"/>
+    <p:sldLayoutId id="2147483689" r:id="rId5"/>
+    <p:sldLayoutId id="2147483690" r:id="rId6"/>
+    <p:sldLayoutId id="2147483691" r:id="rId7"/>
+    <p:sldLayoutId id="2147483692" r:id="rId8"/>
+    <p:sldLayoutId id="2147483693" r:id="rId9"/>
+    <p:sldLayoutId id="2147483694" r:id="rId10"/>
+    <p:sldLayoutId id="2147483695" r:id="rId11"/>
   </p:sldLayoutIdLst>
   <p:txStyles>
     <p:titleStyle>
-      <a:lvl1pPr algn="l" defTabSz="432054" rtl="0" eaLnBrk="1" latinLnBrk="0" hangingPunct="1">
+      <a:lvl1pPr algn="l" defTabSz="398313" rtl="0" eaLnBrk="1" latinLnBrk="0" hangingPunct="1">
         <a:lnSpc>
           <a:spcPct val="90000"/>
         </a:lnSpc>
@@ -2683,7 +2683,7 @@
           <a:spcPct val="0"/>
         </a:spcBef>
         <a:buNone/>
-        <a:defRPr sz="2079" kern="1200">
+        <a:defRPr sz="1917" kern="1200">
           <a:solidFill>
             <a:schemeClr val="tx1"/>
           </a:solidFill>
@@ -2694,16 +2694,16 @@
       </a:lvl1pPr>
     </p:titleStyle>
     <p:bodyStyle>
-      <a:lvl1pPr marL="108014" indent="-108014" algn="l" defTabSz="432054" rtl="0" eaLnBrk="1" latinLnBrk="0" hangingPunct="1">
+      <a:lvl1pPr marL="99578" indent="-99578" algn="l" defTabSz="398313" rtl="0" eaLnBrk="1" latinLnBrk="0" hangingPunct="1">
         <a:lnSpc>
           <a:spcPct val="90000"/>
         </a:lnSpc>
         <a:spcBef>
-          <a:spcPts val="472"/>
+          <a:spcPts val="436"/>
         </a:spcBef>
         <a:buFont typeface="Arial" panose="020B0604020202020204" pitchFamily="34" charset="0"/>
         <a:buChar char="•"/>
-        <a:defRPr sz="1323" kern="1200">
+        <a:defRPr sz="1220" kern="1200">
           <a:solidFill>
             <a:schemeClr val="tx1"/>
           </a:solidFill>
@@ -2712,16 +2712,16 @@
           <a:cs typeface="+mn-cs"/>
         </a:defRPr>
       </a:lvl1pPr>
-      <a:lvl2pPr marL="324041" indent="-108014" algn="l" defTabSz="432054" rtl="0" eaLnBrk="1" latinLnBrk="0" hangingPunct="1">
+      <a:lvl2pPr marL="298734" indent="-99578" algn="l" defTabSz="398313" rtl="0" eaLnBrk="1" latinLnBrk="0" hangingPunct="1">
         <a:lnSpc>
           <a:spcPct val="90000"/>
         </a:lnSpc>
         <a:spcBef>
-          <a:spcPts val="236"/>
+          <a:spcPts val="218"/>
         </a:spcBef>
         <a:buFont typeface="Arial" panose="020B0604020202020204" pitchFamily="34" charset="0"/>
         <a:buChar char="•"/>
-        <a:defRPr sz="1134" kern="1200">
+        <a:defRPr sz="1045" kern="1200">
           <a:solidFill>
             <a:schemeClr val="tx1"/>
           </a:solidFill>
@@ -2730,16 +2730,16 @@
           <a:cs typeface="+mn-cs"/>
         </a:defRPr>
       </a:lvl2pPr>
-      <a:lvl3pPr marL="540068" indent="-108014" algn="l" defTabSz="432054" rtl="0" eaLnBrk="1" latinLnBrk="0" hangingPunct="1">
+      <a:lvl3pPr marL="497891" indent="-99578" algn="l" defTabSz="398313" rtl="0" eaLnBrk="1" latinLnBrk="0" hangingPunct="1">
         <a:lnSpc>
           <a:spcPct val="90000"/>
         </a:lnSpc>
         <a:spcBef>
-          <a:spcPts val="236"/>
+          <a:spcPts val="218"/>
         </a:spcBef>
         <a:buFont typeface="Arial" panose="020B0604020202020204" pitchFamily="34" charset="0"/>
         <a:buChar char="•"/>
-        <a:defRPr sz="945" kern="1200">
+        <a:defRPr sz="871" kern="1200">
           <a:solidFill>
             <a:schemeClr val="tx1"/>
           </a:solidFill>
@@ -2748,16 +2748,16 @@
           <a:cs typeface="+mn-cs"/>
         </a:defRPr>
       </a:lvl3pPr>
-      <a:lvl4pPr marL="756095" indent="-108014" algn="l" defTabSz="432054" rtl="0" eaLnBrk="1" latinLnBrk="0" hangingPunct="1">
+      <a:lvl4pPr marL="697047" indent="-99578" algn="l" defTabSz="398313" rtl="0" eaLnBrk="1" latinLnBrk="0" hangingPunct="1">
         <a:lnSpc>
           <a:spcPct val="90000"/>
         </a:lnSpc>
         <a:spcBef>
-          <a:spcPts val="236"/>
+          <a:spcPts val="218"/>
         </a:spcBef>
         <a:buFont typeface="Arial" panose="020B0604020202020204" pitchFamily="34" charset="0"/>
         <a:buChar char="•"/>
-        <a:defRPr sz="851" kern="1200">
+        <a:defRPr sz="784" kern="1200">
           <a:solidFill>
             <a:schemeClr val="tx1"/>
           </a:solidFill>
@@ -2766,16 +2766,16 @@
           <a:cs typeface="+mn-cs"/>
         </a:defRPr>
       </a:lvl4pPr>
-      <a:lvl5pPr marL="972122" indent="-108014" algn="l" defTabSz="432054" rtl="0" eaLnBrk="1" latinLnBrk="0" hangingPunct="1">
+      <a:lvl5pPr marL="896203" indent="-99578" algn="l" defTabSz="398313" rtl="0" eaLnBrk="1" latinLnBrk="0" hangingPunct="1">
         <a:lnSpc>
           <a:spcPct val="90000"/>
         </a:lnSpc>
         <a:spcBef>
-          <a:spcPts val="236"/>
+          <a:spcPts val="218"/>
         </a:spcBef>
         <a:buFont typeface="Arial" panose="020B0604020202020204" pitchFamily="34" charset="0"/>
         <a:buChar char="•"/>
-        <a:defRPr sz="851" kern="1200">
+        <a:defRPr sz="784" kern="1200">
           <a:solidFill>
             <a:schemeClr val="tx1"/>
           </a:solidFill>
@@ -2784,16 +2784,16 @@
           <a:cs typeface="+mn-cs"/>
         </a:defRPr>
       </a:lvl5pPr>
-      <a:lvl6pPr marL="1188149" indent="-108014" algn="l" defTabSz="432054" rtl="0" eaLnBrk="1" latinLnBrk="0" hangingPunct="1">
+      <a:lvl6pPr marL="1095360" indent="-99578" algn="l" defTabSz="398313" rtl="0" eaLnBrk="1" latinLnBrk="0" hangingPunct="1">
         <a:lnSpc>
           <a:spcPct val="90000"/>
         </a:lnSpc>
         <a:spcBef>
-          <a:spcPts val="236"/>
+          <a:spcPts val="218"/>
         </a:spcBef>
         <a:buFont typeface="Arial" panose="020B0604020202020204" pitchFamily="34" charset="0"/>
         <a:buChar char="•"/>
-        <a:defRPr sz="851" kern="1200">
+        <a:defRPr sz="784" kern="1200">
           <a:solidFill>
             <a:schemeClr val="tx1"/>
           </a:solidFill>
@@ -2802,16 +2802,16 @@
           <a:cs typeface="+mn-cs"/>
         </a:defRPr>
       </a:lvl6pPr>
-      <a:lvl7pPr marL="1404176" indent="-108014" algn="l" defTabSz="432054" rtl="0" eaLnBrk="1" latinLnBrk="0" hangingPunct="1">
+      <a:lvl7pPr marL="1294516" indent="-99578" algn="l" defTabSz="398313" rtl="0" eaLnBrk="1" latinLnBrk="0" hangingPunct="1">
         <a:lnSpc>
           <a:spcPct val="90000"/>
         </a:lnSpc>
         <a:spcBef>
-          <a:spcPts val="236"/>
+          <a:spcPts val="218"/>
         </a:spcBef>
         <a:buFont typeface="Arial" panose="020B0604020202020204" pitchFamily="34" charset="0"/>
         <a:buChar char="•"/>
-        <a:defRPr sz="851" kern="1200">
+        <a:defRPr sz="784" kern="1200">
           <a:solidFill>
             <a:schemeClr val="tx1"/>
           </a:solidFill>
@@ -2820,16 +2820,16 @@
           <a:cs typeface="+mn-cs"/>
         </a:defRPr>
       </a:lvl7pPr>
-      <a:lvl8pPr marL="1620203" indent="-108014" algn="l" defTabSz="432054" rtl="0" eaLnBrk="1" latinLnBrk="0" hangingPunct="1">
+      <a:lvl8pPr marL="1493672" indent="-99578" algn="l" defTabSz="398313" rtl="0" eaLnBrk="1" latinLnBrk="0" hangingPunct="1">
         <a:lnSpc>
           <a:spcPct val="90000"/>
         </a:lnSpc>
         <a:spcBef>
-          <a:spcPts val="236"/>
+          <a:spcPts val="218"/>
         </a:spcBef>
         <a:buFont typeface="Arial" panose="020B0604020202020204" pitchFamily="34" charset="0"/>
         <a:buChar char="•"/>
-        <a:defRPr sz="851" kern="1200">
+        <a:defRPr sz="784" kern="1200">
           <a:solidFill>
             <a:schemeClr val="tx1"/>
           </a:solidFill>
@@ -2838,16 +2838,16 @@
           <a:cs typeface="+mn-cs"/>
         </a:defRPr>
       </a:lvl8pPr>
-      <a:lvl9pPr marL="1836230" indent="-108014" algn="l" defTabSz="432054" rtl="0" eaLnBrk="1" latinLnBrk="0" hangingPunct="1">
+      <a:lvl9pPr marL="1692829" indent="-99578" algn="l" defTabSz="398313" rtl="0" eaLnBrk="1" latinLnBrk="0" hangingPunct="1">
         <a:lnSpc>
           <a:spcPct val="90000"/>
         </a:lnSpc>
         <a:spcBef>
-          <a:spcPts val="236"/>
+          <a:spcPts val="218"/>
         </a:spcBef>
         <a:buFont typeface="Arial" panose="020B0604020202020204" pitchFamily="34" charset="0"/>
         <a:buChar char="•"/>
-        <a:defRPr sz="851" kern="1200">
+        <a:defRPr sz="784" kern="1200">
           <a:solidFill>
             <a:schemeClr val="tx1"/>
           </a:solidFill>
@@ -2861,8 +2861,8 @@
       <a:defPPr>
         <a:defRPr lang="en-US"/>
       </a:defPPr>
-      <a:lvl1pPr marL="0" algn="l" defTabSz="432054" rtl="0" eaLnBrk="1" latinLnBrk="0" hangingPunct="1">
-        <a:defRPr sz="851" kern="1200">
+      <a:lvl1pPr marL="0" algn="l" defTabSz="398313" rtl="0" eaLnBrk="1" latinLnBrk="0" hangingPunct="1">
+        <a:defRPr sz="784" kern="1200">
           <a:solidFill>
             <a:schemeClr val="tx1"/>
           </a:solidFill>
@@ -2871,8 +2871,8 @@
           <a:cs typeface="+mn-cs"/>
         </a:defRPr>
       </a:lvl1pPr>
-      <a:lvl2pPr marL="216027" algn="l" defTabSz="432054" rtl="0" eaLnBrk="1" latinLnBrk="0" hangingPunct="1">
-        <a:defRPr sz="851" kern="1200">
+      <a:lvl2pPr marL="199156" algn="l" defTabSz="398313" rtl="0" eaLnBrk="1" latinLnBrk="0" hangingPunct="1">
+        <a:defRPr sz="784" kern="1200">
           <a:solidFill>
             <a:schemeClr val="tx1"/>
           </a:solidFill>
@@ -2881,8 +2881,8 @@
           <a:cs typeface="+mn-cs"/>
         </a:defRPr>
       </a:lvl2pPr>
-      <a:lvl3pPr marL="432054" algn="l" defTabSz="432054" rtl="0" eaLnBrk="1" latinLnBrk="0" hangingPunct="1">
-        <a:defRPr sz="851" kern="1200">
+      <a:lvl3pPr marL="398313" algn="l" defTabSz="398313" rtl="0" eaLnBrk="1" latinLnBrk="0" hangingPunct="1">
+        <a:defRPr sz="784" kern="1200">
           <a:solidFill>
             <a:schemeClr val="tx1"/>
           </a:solidFill>
@@ -2891,8 +2891,8 @@
           <a:cs typeface="+mn-cs"/>
         </a:defRPr>
       </a:lvl3pPr>
-      <a:lvl4pPr marL="648081" algn="l" defTabSz="432054" rtl="0" eaLnBrk="1" latinLnBrk="0" hangingPunct="1">
-        <a:defRPr sz="851" kern="1200">
+      <a:lvl4pPr marL="597469" algn="l" defTabSz="398313" rtl="0" eaLnBrk="1" latinLnBrk="0" hangingPunct="1">
+        <a:defRPr sz="784" kern="1200">
           <a:solidFill>
             <a:schemeClr val="tx1"/>
           </a:solidFill>
@@ -2901,8 +2901,8 @@
           <a:cs typeface="+mn-cs"/>
         </a:defRPr>
       </a:lvl4pPr>
-      <a:lvl5pPr marL="864108" algn="l" defTabSz="432054" rtl="0" eaLnBrk="1" latinLnBrk="0" hangingPunct="1">
-        <a:defRPr sz="851" kern="1200">
+      <a:lvl5pPr marL="796625" algn="l" defTabSz="398313" rtl="0" eaLnBrk="1" latinLnBrk="0" hangingPunct="1">
+        <a:defRPr sz="784" kern="1200">
           <a:solidFill>
             <a:schemeClr val="tx1"/>
           </a:solidFill>
@@ -2911,8 +2911,8 @@
           <a:cs typeface="+mn-cs"/>
         </a:defRPr>
       </a:lvl5pPr>
-      <a:lvl6pPr marL="1080135" algn="l" defTabSz="432054" rtl="0" eaLnBrk="1" latinLnBrk="0" hangingPunct="1">
-        <a:defRPr sz="851" kern="1200">
+      <a:lvl6pPr marL="995782" algn="l" defTabSz="398313" rtl="0" eaLnBrk="1" latinLnBrk="0" hangingPunct="1">
+        <a:defRPr sz="784" kern="1200">
           <a:solidFill>
             <a:schemeClr val="tx1"/>
           </a:solidFill>
@@ -2921,8 +2921,8 @@
           <a:cs typeface="+mn-cs"/>
         </a:defRPr>
       </a:lvl6pPr>
-      <a:lvl7pPr marL="1296162" algn="l" defTabSz="432054" rtl="0" eaLnBrk="1" latinLnBrk="0" hangingPunct="1">
-        <a:defRPr sz="851" kern="1200">
+      <a:lvl7pPr marL="1194938" algn="l" defTabSz="398313" rtl="0" eaLnBrk="1" latinLnBrk="0" hangingPunct="1">
+        <a:defRPr sz="784" kern="1200">
           <a:solidFill>
             <a:schemeClr val="tx1"/>
           </a:solidFill>
@@ -2931,8 +2931,8 @@
           <a:cs typeface="+mn-cs"/>
         </a:defRPr>
       </a:lvl7pPr>
-      <a:lvl8pPr marL="1512189" algn="l" defTabSz="432054" rtl="0" eaLnBrk="1" latinLnBrk="0" hangingPunct="1">
-        <a:defRPr sz="851" kern="1200">
+      <a:lvl8pPr marL="1394094" algn="l" defTabSz="398313" rtl="0" eaLnBrk="1" latinLnBrk="0" hangingPunct="1">
+        <a:defRPr sz="784" kern="1200">
           <a:solidFill>
             <a:schemeClr val="tx1"/>
           </a:solidFill>
@@ -2941,8 +2941,8 @@
           <a:cs typeface="+mn-cs"/>
         </a:defRPr>
       </a:lvl8pPr>
-      <a:lvl9pPr marL="1728216" algn="l" defTabSz="432054" rtl="0" eaLnBrk="1" latinLnBrk="0" hangingPunct="1">
-        <a:defRPr sz="851" kern="1200">
+      <a:lvl9pPr marL="1593251" algn="l" defTabSz="398313" rtl="0" eaLnBrk="1" latinLnBrk="0" hangingPunct="1">
+        <a:defRPr sz="784" kern="1200">
           <a:solidFill>
             <a:schemeClr val="tx1"/>
           </a:solidFill>
@@ -2987,7 +2987,7 @@
         </p:nvSpPr>
         <p:spPr>
           <a:xfrm>
-            <a:off x="57786" y="66112"/>
+            <a:off x="223942" y="89006"/>
             <a:ext cx="8096150" cy="2809662"/>
           </a:xfrm>
           <a:prstGeom prst="rect">
@@ -3051,7 +3051,7 @@
         </p:nvSpPr>
         <p:spPr>
           <a:xfrm>
-            <a:off x="168271" y="2259880"/>
+            <a:off x="334427" y="2282775"/>
             <a:ext cx="1694645" cy="520947"/>
           </a:xfrm>
           <a:prstGeom prst="rect">
@@ -3137,7 +3137,7 @@
         </p:nvSpPr>
         <p:spPr>
           <a:xfrm>
-            <a:off x="158113" y="406665"/>
+            <a:off x="324269" y="429560"/>
             <a:ext cx="2370720" cy="1560953"/>
           </a:xfrm>
           <a:prstGeom prst="rect">
@@ -3221,7 +3221,7 @@
         </p:nvSpPr>
         <p:spPr>
           <a:xfrm>
-            <a:off x="231937" y="706313"/>
+            <a:off x="398093" y="729208"/>
             <a:ext cx="2227185" cy="1131327"/>
           </a:xfrm>
           <a:prstGeom prst="roundRect">
@@ -3309,7 +3309,7 @@
         </p:nvSpPr>
         <p:spPr>
           <a:xfrm>
-            <a:off x="295419" y="1053029"/>
+            <a:off x="461576" y="1075923"/>
             <a:ext cx="1563037" cy="664870"/>
           </a:xfrm>
           <a:prstGeom prst="roundRect">
@@ -3397,7 +3397,7 @@
         </p:nvSpPr>
         <p:spPr>
           <a:xfrm>
-            <a:off x="1898371" y="1053029"/>
+            <a:off x="2064527" y="1075923"/>
             <a:ext cx="227444" cy="664870"/>
           </a:xfrm>
           <a:prstGeom prst="roundRect">
@@ -3477,7 +3477,7 @@
         </p:nvSpPr>
         <p:spPr>
           <a:xfrm>
-            <a:off x="2165968" y="1053029"/>
+            <a:off x="2332124" y="1075923"/>
             <a:ext cx="227444" cy="664870"/>
           </a:xfrm>
           <a:prstGeom prst="roundRect">
@@ -3557,7 +3557,7 @@
         </p:nvSpPr>
         <p:spPr>
           <a:xfrm>
-            <a:off x="353146" y="1345290"/>
+            <a:off x="519302" y="1368184"/>
             <a:ext cx="1067168" cy="288320"/>
           </a:xfrm>
           <a:prstGeom prst="roundRect">
@@ -3643,7 +3643,7 @@
         </p:nvSpPr>
         <p:spPr>
           <a:xfrm flipH="1">
-            <a:off x="1466490" y="1345290"/>
+            <a:off x="1632647" y="1368184"/>
             <a:ext cx="120311" cy="288320"/>
           </a:xfrm>
           <a:prstGeom prst="roundRect">
@@ -3721,7 +3721,7 @@
         </p:nvSpPr>
         <p:spPr>
           <a:xfrm>
-            <a:off x="503843" y="1647972"/>
+            <a:off x="669999" y="1670867"/>
             <a:ext cx="304394" cy="688315"/>
           </a:xfrm>
           <a:prstGeom prst="downArrow">
@@ -3788,7 +3788,7 @@
         </p:nvSpPr>
         <p:spPr>
           <a:xfrm flipH="1">
-            <a:off x="1620494" y="1345290"/>
+            <a:off x="1786651" y="1368184"/>
             <a:ext cx="120311" cy="288320"/>
           </a:xfrm>
           <a:prstGeom prst="roundRect">
@@ -3880,7 +3880,7 @@
         </p:blipFill>
         <p:spPr>
           <a:xfrm>
-            <a:off x="641081" y="739501"/>
+            <a:off x="807238" y="762396"/>
             <a:ext cx="295675" cy="298581"/>
           </a:xfrm>
           <a:prstGeom prst="rect">
@@ -3902,7 +3902,7 @@
         </p:nvSpPr>
         <p:spPr>
           <a:xfrm>
-            <a:off x="2622138" y="420397"/>
+            <a:off x="2788294" y="443291"/>
             <a:ext cx="1919768" cy="1820698"/>
           </a:xfrm>
           <a:prstGeom prst="rect">
@@ -3986,7 +3986,7 @@
         </p:nvSpPr>
         <p:spPr>
           <a:xfrm>
-            <a:off x="4852944" y="420398"/>
+            <a:off x="5019101" y="443293"/>
             <a:ext cx="3246979" cy="1820697"/>
           </a:xfrm>
           <a:prstGeom prst="rect">
@@ -4070,7 +4070,7 @@
         </p:nvSpPr>
         <p:spPr>
           <a:xfrm>
-            <a:off x="4195307" y="1832117"/>
+            <a:off x="4361464" y="1855011"/>
             <a:ext cx="1028533" cy="248250"/>
           </a:xfrm>
           <a:prstGeom prst="roundRect">
@@ -4134,7 +4134,7 @@
         </p:nvSpPr>
         <p:spPr>
           <a:xfrm>
-            <a:off x="2769522" y="848072"/>
+            <a:off x="2935679" y="870967"/>
             <a:ext cx="1463679" cy="1211819"/>
           </a:xfrm>
           <a:custGeom>
@@ -4362,7 +4362,7 @@
         </p:blipFill>
         <p:spPr>
           <a:xfrm>
-            <a:off x="2905884" y="929136"/>
+            <a:off x="3072040" y="952030"/>
             <a:ext cx="534420" cy="534420"/>
           </a:xfrm>
           <a:prstGeom prst="rect">
@@ -4384,7 +4384,7 @@
         </p:nvGrpSpPr>
         <p:grpSpPr>
           <a:xfrm>
-            <a:off x="3575554" y="1291729"/>
+            <a:off x="3741711" y="1314623"/>
             <a:ext cx="436207" cy="438424"/>
             <a:chOff x="7079832" y="2188987"/>
             <a:chExt cx="667891" cy="707548"/>
@@ -4491,7 +4491,7 @@
         </p:blipFill>
         <p:spPr>
           <a:xfrm>
-            <a:off x="3180377" y="1550753"/>
+            <a:off x="3346534" y="1573648"/>
             <a:ext cx="410725" cy="410725"/>
           </a:xfrm>
           <a:prstGeom prst="rect">
@@ -4513,7 +4513,7 @@
         </p:nvGrpSpPr>
         <p:grpSpPr>
           <a:xfrm>
-            <a:off x="5831716" y="1187141"/>
+            <a:off x="5997873" y="1210035"/>
             <a:ext cx="436207" cy="438424"/>
             <a:chOff x="7079832" y="2188987"/>
             <a:chExt cx="667891" cy="707548"/>
@@ -4620,7 +4620,7 @@
         </p:blipFill>
         <p:spPr>
           <a:xfrm>
-            <a:off x="5436539" y="1446165"/>
+            <a:off x="5602696" y="1469060"/>
             <a:ext cx="410725" cy="410725"/>
           </a:xfrm>
           <a:prstGeom prst="rect">
@@ -4656,7 +4656,7 @@
         </p:blipFill>
         <p:spPr>
           <a:xfrm>
-            <a:off x="5106465" y="865326"/>
+            <a:off x="5272622" y="888221"/>
             <a:ext cx="590507" cy="590507"/>
           </a:xfrm>
           <a:prstGeom prst="rect">
@@ -4692,7 +4692,7 @@
         </p:blipFill>
         <p:spPr>
           <a:xfrm>
-            <a:off x="5604984" y="443108"/>
+            <a:off x="5771140" y="466002"/>
             <a:ext cx="334416" cy="334416"/>
           </a:xfrm>
           <a:prstGeom prst="rect">
@@ -4714,7 +4714,7 @@
         </p:nvSpPr>
         <p:spPr>
           <a:xfrm>
-            <a:off x="1783418" y="2110333"/>
+            <a:off x="1949574" y="2133227"/>
             <a:ext cx="2848892" cy="410936"/>
           </a:xfrm>
           <a:prstGeom prst="bentUpArrow">
@@ -4771,7 +4771,7 @@
         </p:nvSpPr>
         <p:spPr>
           <a:xfrm>
-            <a:off x="1783418" y="1967617"/>
+            <a:off x="1949574" y="1990511"/>
             <a:ext cx="5873062" cy="699978"/>
           </a:xfrm>
           <a:prstGeom prst="bentUpArrow">
@@ -4828,7 +4828,7 @@
         </p:nvSpPr>
         <p:spPr>
           <a:xfrm>
-            <a:off x="2125815" y="2302180"/>
+            <a:off x="2291971" y="2325074"/>
             <a:ext cx="976854" cy="427096"/>
           </a:xfrm>
           <a:prstGeom prst="roundRect">
@@ -4895,7 +4895,7 @@
         </p:nvGrpSpPr>
         <p:grpSpPr>
           <a:xfrm>
-            <a:off x="4662458" y="1975500"/>
+            <a:off x="4828615" y="1998394"/>
             <a:ext cx="2697761" cy="545128"/>
             <a:chOff x="4351210" y="4175737"/>
             <a:chExt cx="4025020" cy="583570"/>
@@ -5032,7 +5032,7 @@
         </p:nvSpPr>
         <p:spPr>
           <a:xfrm flipH="1">
-            <a:off x="598301" y="2358748"/>
+            <a:off x="764458" y="2381642"/>
             <a:ext cx="130009" cy="334666"/>
           </a:xfrm>
           <a:prstGeom prst="roundRect">
@@ -5114,7 +5114,7 @@
         </p:nvSpPr>
         <p:spPr>
           <a:xfrm flipH="1">
-            <a:off x="753510" y="2358748"/>
+            <a:off x="919667" y="2381642"/>
             <a:ext cx="130009" cy="334666"/>
           </a:xfrm>
           <a:prstGeom prst="roundRect">
@@ -5196,7 +5196,7 @@
         </p:nvSpPr>
         <p:spPr>
           <a:xfrm flipH="1">
-            <a:off x="908719" y="2358748"/>
+            <a:off x="1074876" y="2381642"/>
             <a:ext cx="130009" cy="334666"/>
           </a:xfrm>
           <a:prstGeom prst="roundRect">
@@ -5278,7 +5278,7 @@
         </p:nvSpPr>
         <p:spPr>
           <a:xfrm flipH="1">
-            <a:off x="1063928" y="2358748"/>
+            <a:off x="1230085" y="2381642"/>
             <a:ext cx="130009" cy="334666"/>
           </a:xfrm>
           <a:prstGeom prst="roundRect">
@@ -5360,7 +5360,7 @@
         </p:nvSpPr>
         <p:spPr>
           <a:xfrm flipH="1">
-            <a:off x="1219138" y="2358748"/>
+            <a:off x="1385295" y="2381642"/>
             <a:ext cx="130009" cy="334666"/>
           </a:xfrm>
           <a:prstGeom prst="roundRect">
@@ -5442,7 +5442,7 @@
         </p:nvSpPr>
         <p:spPr>
           <a:xfrm flipH="1">
-            <a:off x="1374347" y="2358748"/>
+            <a:off x="1540504" y="2381642"/>
             <a:ext cx="130009" cy="334666"/>
           </a:xfrm>
           <a:prstGeom prst="roundRect">
@@ -5524,7 +5524,7 @@
         </p:nvSpPr>
         <p:spPr>
           <a:xfrm flipH="1">
-            <a:off x="1529556" y="2358748"/>
+            <a:off x="1695713" y="2381642"/>
             <a:ext cx="130009" cy="334666"/>
           </a:xfrm>
           <a:prstGeom prst="roundRect">
@@ -5606,7 +5606,7 @@
         </p:nvSpPr>
         <p:spPr>
           <a:xfrm flipH="1">
-            <a:off x="1684765" y="2358748"/>
+            <a:off x="1850922" y="2381642"/>
             <a:ext cx="130009" cy="334666"/>
           </a:xfrm>
           <a:prstGeom prst="roundRect">
@@ -5688,7 +5688,7 @@
         </p:nvSpPr>
         <p:spPr>
           <a:xfrm>
-            <a:off x="6055902" y="799277"/>
+            <a:off x="6222058" y="822172"/>
             <a:ext cx="1124986" cy="316995"/>
           </a:xfrm>
           <a:prstGeom prst="leftRightArrow">
@@ -5751,7 +5751,7 @@
         </p:nvSpPr>
         <p:spPr>
           <a:xfrm>
-            <a:off x="4890608" y="824116"/>
+            <a:off x="5056765" y="847010"/>
             <a:ext cx="1535009" cy="1231414"/>
           </a:xfrm>
           <a:custGeom>
@@ -5955,7 +5955,7 @@
         </p:nvSpPr>
         <p:spPr>
           <a:xfrm>
-            <a:off x="3422328" y="965837"/>
+            <a:off x="3588484" y="988732"/>
             <a:ext cx="1703392" cy="377731"/>
           </a:xfrm>
           <a:prstGeom prst="rightArrow">
@@ -6008,7 +6008,7 @@
         </p:nvSpPr>
         <p:spPr>
           <a:xfrm>
-            <a:off x="4224399" y="1508833"/>
+            <a:off x="4390555" y="1531728"/>
             <a:ext cx="1044472" cy="316995"/>
           </a:xfrm>
           <a:prstGeom prst="leftRightArrow">
@@ -6068,7 +6068,7 @@
         </p:nvSpPr>
         <p:spPr>
           <a:xfrm rot="5400000" flipH="1">
-            <a:off x="5532955" y="1223217"/>
+            <a:off x="5699111" y="1246111"/>
             <a:ext cx="104584" cy="249196"/>
           </a:xfrm>
           <a:prstGeom prst="roundRect">
@@ -6150,7 +6150,7 @@
         </p:nvSpPr>
         <p:spPr>
           <a:xfrm rot="5400000">
-            <a:off x="6377530" y="1240796"/>
+            <a:off x="6543686" y="1263691"/>
             <a:ext cx="275898" cy="1183451"/>
           </a:xfrm>
           <a:prstGeom prst="downArrow">
@@ -6217,7 +6217,7 @@
         </p:nvSpPr>
         <p:spPr>
           <a:xfrm>
-            <a:off x="6438492" y="1265043"/>
+            <a:off x="6604649" y="1287937"/>
             <a:ext cx="827465" cy="253926"/>
           </a:xfrm>
           <a:prstGeom prst="rightArrow">
@@ -6284,7 +6284,7 @@
         </p:nvSpPr>
         <p:spPr>
           <a:xfrm>
-            <a:off x="6979576" y="1643866"/>
+            <a:off x="7145733" y="1666761"/>
             <a:ext cx="987941" cy="340181"/>
           </a:xfrm>
           <a:prstGeom prst="roundRect">
@@ -6351,7 +6351,7 @@
         </p:nvGrpSpPr>
         <p:grpSpPr>
           <a:xfrm>
-            <a:off x="7239976" y="772481"/>
+            <a:off x="7406132" y="795376"/>
             <a:ext cx="599688" cy="633921"/>
             <a:chOff x="7088031" y="6351077"/>
             <a:chExt cx="599688" cy="633921"/>
@@ -6472,7 +6472,7 @@
         </p:nvSpPr>
         <p:spPr>
           <a:xfrm rot="5400000" flipH="1">
-            <a:off x="5762510" y="1645283"/>
+            <a:off x="5928666" y="1668177"/>
             <a:ext cx="104584" cy="249196"/>
           </a:xfrm>
           <a:prstGeom prst="roundRect">
@@ -6554,7 +6554,7 @@
         </p:nvSpPr>
         <p:spPr>
           <a:xfrm rot="5400000" flipH="1">
-            <a:off x="6183833" y="1265311"/>
+            <a:off x="6349989" y="1288205"/>
             <a:ext cx="104584" cy="249196"/>
           </a:xfrm>
           <a:prstGeom prst="roundRect">
@@ -6650,7 +6650,7 @@
         </p:blipFill>
         <p:spPr>
           <a:xfrm>
-            <a:off x="2788392" y="451952"/>
+            <a:off x="2954548" y="474846"/>
             <a:ext cx="334416" cy="334416"/>
           </a:xfrm>
           <a:prstGeom prst="rect">
@@ -6672,7 +6672,7 @@
         </p:nvSpPr>
         <p:spPr>
           <a:xfrm>
-            <a:off x="5763235" y="142509"/>
+            <a:off x="5929392" y="165404"/>
             <a:ext cx="272329" cy="177901"/>
           </a:xfrm>
           <a:prstGeom prst="roundRect">
@@ -6728,7 +6728,7 @@
         </p:nvSpPr>
         <p:spPr>
           <a:xfrm>
-            <a:off x="5967972" y="68092"/>
+            <a:off x="6134129" y="90986"/>
             <a:ext cx="1269369" cy="338554"/>
           </a:xfrm>
           <a:prstGeom prst="rect">
@@ -6767,7 +6767,7 @@
         </p:nvSpPr>
         <p:spPr>
           <a:xfrm>
-            <a:off x="7034391" y="156822"/>
+            <a:off x="7200548" y="179717"/>
             <a:ext cx="272329" cy="177901"/>
           </a:xfrm>
           <a:prstGeom prst="roundRect">
@@ -6823,7 +6823,7 @@
         </p:nvSpPr>
         <p:spPr>
           <a:xfrm>
-            <a:off x="7239976" y="93310"/>
+            <a:off x="7406132" y="116204"/>
             <a:ext cx="913960" cy="324769"/>
           </a:xfrm>
           <a:prstGeom prst="rect">

</xml_diff>